<commit_message>
A few small tweaks on poster
</commit_message>
<xml_diff>
--- a/SamuelNixon_Poster.pptx
+++ b/SamuelNixon_Poster.pptx
@@ -2988,7 +2988,7 @@
         </p:blipFill>
         <p:spPr>
           <a:xfrm>
-            <a:off x="13094693" y="10781655"/>
+            <a:off x="14878355" y="11376478"/>
             <a:ext cx="4903463" cy="5124521"/>
           </a:xfrm>
           <a:prstGeom prst="rect">
@@ -3420,15 +3420,7 @@
           <a:p>
             <a:r>
               <a:rPr lang="en-US" sz="2800" dirty="0"/>
-              <a:t>Asset location in industry using devices with on-board GPS radios is a problem that already has a solution. However, a low cost solution that can leverage existing on-board technology (such as AOBRD/ELD) has yet to be developed. Simple </a:t>
-            </a:r>
-            <a:r>
-              <a:rPr lang="en-US" sz="2800" dirty="0" err="1"/>
-              <a:t>bluetooth</a:t>
-            </a:r>
-            <a:r>
-              <a:rPr lang="en-US" sz="2800" dirty="0"/>
-              <a:t> beacons can be bought off-the-shelf from vendors easily, and this project seeks to utilize these simple beacons in combination with connected devices and cloud services to provide a solution that will allow monitoring and reporting of device locations in a site or yard.</a:t>
+              <a:t>Asset location in industry using devices with on-board GPS radios is a problem that already has a solution. However, a low cost solution that can leverage existing on-board technology (such as AOBRD/ELD) has yet to be developed. Simple Bluetooth beacons can be bought off-the-shelf from vendors easily, and this project seeks to utilize these simple beacons in combination with connected devices and cloud services to provide a solution that will allow monitoring and reporting of device locations in a site or yard.</a:t>
             </a:r>
           </a:p>
         </p:txBody>
@@ -3589,8 +3581,21 @@
                   <a:schemeClr val="bg1"/>
                 </a:solidFill>
               </a:rPr>
-              <a:t>3. Approach</a:t>
-            </a:r>
+              <a:t>3. </a:t>
+            </a:r>
+            <a:r>
+              <a:rPr lang="en-US">
+                <a:solidFill>
+                  <a:schemeClr val="bg1"/>
+                </a:solidFill>
+              </a:rPr>
+              <a:t>Implementation</a:t>
+            </a:r>
+            <a:endParaRPr lang="en-US" dirty="0">
+              <a:solidFill>
+                <a:schemeClr val="bg1"/>
+              </a:solidFill>
+            </a:endParaRPr>
           </a:p>
         </p:txBody>
       </p:sp>
@@ -3659,7 +3664,7 @@
         </p:blipFill>
         <p:spPr>
           <a:xfrm>
-            <a:off x="457200" y="12494347"/>
+            <a:off x="368299" y="12776801"/>
             <a:ext cx="7607447" cy="2914039"/>
           </a:xfrm>
           <a:prstGeom prst="rect">
@@ -3689,7 +3694,7 @@
         </p:blipFill>
         <p:spPr>
           <a:xfrm>
-            <a:off x="8570913" y="11587627"/>
+            <a:off x="9510713" y="12293317"/>
             <a:ext cx="4419600" cy="3810000"/>
           </a:xfrm>
           <a:prstGeom prst="rect">

</xml_diff>